<commit_message>
ADDED Class 16 ppt
</commit_message>
<xml_diff>
--- a/Presentations/AVR Live Class 13.pptx
+++ b/Presentations/AVR Live Class 13.pptx
@@ -9655,7 +9655,7 @@
                         <a:buNone/>
                       </a:pPr>
                       <a:r>
-                        <a:rPr lang="en-IN" sz="1200"/>
+                        <a:rPr lang="en-IN" sz="1200" dirty="0"/>
                         <a:t>7</a:t>
                       </a:r>
                     </a:p>
@@ -9825,7 +9825,7 @@
                         <a:buNone/>
                       </a:pPr>
                       <a:r>
-                        <a:rPr lang="en-IN" sz="1200"/>
+                        <a:rPr lang="en-IN" sz="1200" dirty="0"/>
                         <a:t>6</a:t>
                       </a:r>
                     </a:p>
@@ -9995,7 +9995,7 @@
                         <a:buNone/>
                       </a:pPr>
                       <a:r>
-                        <a:rPr lang="en-IN" sz="1200"/>
+                        <a:rPr lang="en-IN" sz="1200" dirty="0"/>
                         <a:t>5</a:t>
                       </a:r>
                     </a:p>
@@ -10853,7 +10853,7 @@
                         <a:buNone/>
                       </a:pPr>
                       <a:r>
-                        <a:rPr lang="en-IN" sz="1200"/>
+                        <a:rPr lang="en-IN" sz="1200" dirty="0"/>
                         <a:t>0</a:t>
                       </a:r>
                     </a:p>
@@ -11862,7 +11862,7 @@
                         <a:buNone/>
                       </a:pPr>
                       <a:r>
-                        <a:rPr lang="en-US" sz="1200"/>
+                        <a:rPr lang="en-US" sz="1200" dirty="0"/>
                         <a:t>Data Register Empty Interrupt Enable</a:t>
                       </a:r>
                     </a:p>
@@ -12542,7 +12542,7 @@
                         <a:buNone/>
                       </a:pPr>
                       <a:r>
-                        <a:rPr lang="en-US" sz="1200"/>
+                        <a:rPr lang="en-US" sz="1200" dirty="0"/>
                         <a:t>Received data bit 8 (9-bit mode)</a:t>
                       </a:r>
                     </a:p>

</xml_diff>